<commit_message>
plot in 3d voxels with a cut, PPT updating
</commit_message>
<xml_diff>
--- a/images/images.pptx
+++ b/images/images.pptx
@@ -5,8 +5,9 @@
     <p:sldMasterId id="2147483648" r:id="rId1"/>
   </p:sldMasterIdLst>
   <p:sldIdLst>
-    <p:sldId id="256" r:id="rId2"/>
-    <p:sldId id="257" r:id="rId3"/>
+    <p:sldId id="257" r:id="rId2"/>
+    <p:sldId id="258" r:id="rId3"/>
+    <p:sldId id="259" r:id="rId4"/>
   </p:sldIdLst>
   <p:sldSz cx="12192000" cy="6858000"/>
   <p:notesSz cx="6858000" cy="9144000"/>
@@ -105,6 +106,11 @@
       </a:defRPr>
     </a:lvl9pPr>
   </p:defaultTextStyle>
+  <p:extLst>
+    <p:ext uri="{EFAFB233-063F-42B5-8137-9DF3F51BA10A}">
+      <p15:sldGuideLst xmlns:p15="http://schemas.microsoft.com/office/powerpoint/2012/main"/>
+    </p:ext>
+  </p:extLst>
 </p:presentation>
 </file>
 
@@ -255,7 +261,7 @@
           <a:p>
             <a:fld id="{8E09689C-7521-CF46-95C3-5F59D88498A3}" type="datetimeFigureOut">
               <a:rPr lang="en-US" smtClean="0"/>
-              <a:t>2/27/21</a:t>
+              <a:t>4/5/21</a:t>
             </a:fld>
             <a:endParaRPr lang="en-US"/>
           </a:p>
@@ -453,7 +459,7 @@
           <a:p>
             <a:fld id="{8E09689C-7521-CF46-95C3-5F59D88498A3}" type="datetimeFigureOut">
               <a:rPr lang="en-US" smtClean="0"/>
-              <a:t>2/27/21</a:t>
+              <a:t>4/5/21</a:t>
             </a:fld>
             <a:endParaRPr lang="en-US"/>
           </a:p>
@@ -661,7 +667,7 @@
           <a:p>
             <a:fld id="{8E09689C-7521-CF46-95C3-5F59D88498A3}" type="datetimeFigureOut">
               <a:rPr lang="en-US" smtClean="0"/>
-              <a:t>2/27/21</a:t>
+              <a:t>4/5/21</a:t>
             </a:fld>
             <a:endParaRPr lang="en-US"/>
           </a:p>
@@ -859,7 +865,7 @@
           <a:p>
             <a:fld id="{8E09689C-7521-CF46-95C3-5F59D88498A3}" type="datetimeFigureOut">
               <a:rPr lang="en-US" smtClean="0"/>
-              <a:t>2/27/21</a:t>
+              <a:t>4/5/21</a:t>
             </a:fld>
             <a:endParaRPr lang="en-US"/>
           </a:p>
@@ -1134,7 +1140,7 @@
           <a:p>
             <a:fld id="{8E09689C-7521-CF46-95C3-5F59D88498A3}" type="datetimeFigureOut">
               <a:rPr lang="en-US" smtClean="0"/>
-              <a:t>2/27/21</a:t>
+              <a:t>4/5/21</a:t>
             </a:fld>
             <a:endParaRPr lang="en-US"/>
           </a:p>
@@ -1399,7 +1405,7 @@
           <a:p>
             <a:fld id="{8E09689C-7521-CF46-95C3-5F59D88498A3}" type="datetimeFigureOut">
               <a:rPr lang="en-US" smtClean="0"/>
-              <a:t>2/27/21</a:t>
+              <a:t>4/5/21</a:t>
             </a:fld>
             <a:endParaRPr lang="en-US"/>
           </a:p>
@@ -1811,7 +1817,7 @@
           <a:p>
             <a:fld id="{8E09689C-7521-CF46-95C3-5F59D88498A3}" type="datetimeFigureOut">
               <a:rPr lang="en-US" smtClean="0"/>
-              <a:t>2/27/21</a:t>
+              <a:t>4/5/21</a:t>
             </a:fld>
             <a:endParaRPr lang="en-US"/>
           </a:p>
@@ -1952,7 +1958,7 @@
           <a:p>
             <a:fld id="{8E09689C-7521-CF46-95C3-5F59D88498A3}" type="datetimeFigureOut">
               <a:rPr lang="en-US" smtClean="0"/>
-              <a:t>2/27/21</a:t>
+              <a:t>4/5/21</a:t>
             </a:fld>
             <a:endParaRPr lang="en-US"/>
           </a:p>
@@ -2065,7 +2071,7 @@
           <a:p>
             <a:fld id="{8E09689C-7521-CF46-95C3-5F59D88498A3}" type="datetimeFigureOut">
               <a:rPr lang="en-US" smtClean="0"/>
-              <a:t>2/27/21</a:t>
+              <a:t>4/5/21</a:t>
             </a:fld>
             <a:endParaRPr lang="en-US"/>
           </a:p>
@@ -2376,7 +2382,7 @@
           <a:p>
             <a:fld id="{8E09689C-7521-CF46-95C3-5F59D88498A3}" type="datetimeFigureOut">
               <a:rPr lang="en-US" smtClean="0"/>
-              <a:t>2/27/21</a:t>
+              <a:t>4/5/21</a:t>
             </a:fld>
             <a:endParaRPr lang="en-US"/>
           </a:p>
@@ -2664,7 +2670,7 @@
           <a:p>
             <a:fld id="{8E09689C-7521-CF46-95C3-5F59D88498A3}" type="datetimeFigureOut">
               <a:rPr lang="en-US" smtClean="0"/>
-              <a:t>2/27/21</a:t>
+              <a:t>4/5/21</a:t>
             </a:fld>
             <a:endParaRPr lang="en-US"/>
           </a:p>
@@ -2905,7 +2911,7 @@
           <a:p>
             <a:fld id="{8E09689C-7521-CF46-95C3-5F59D88498A3}" type="datetimeFigureOut">
               <a:rPr lang="en-US" smtClean="0"/>
-              <a:t>2/27/21</a:t>
+              <a:t>4/5/21</a:t>
             </a:fld>
             <a:endParaRPr lang="en-US"/>
           </a:p>
@@ -3322,86 +3328,6 @@
           <a:chExt cx="0" cy="0"/>
         </a:xfrm>
       </p:grpSpPr>
-      <p:sp>
-        <p:nvSpPr>
-          <p:cNvPr id="2" name="Title 1">
-            <a:extLst>
-              <a:ext uri="{FF2B5EF4-FFF2-40B4-BE49-F238E27FC236}">
-                <a16:creationId xmlns:a16="http://schemas.microsoft.com/office/drawing/2014/main" id="{71E2EACA-4F01-7341-B27D-3C03007FA16D}"/>
-              </a:ext>
-            </a:extLst>
-          </p:cNvPr>
-          <p:cNvSpPr>
-            <a:spLocks noGrp="1"/>
-          </p:cNvSpPr>
-          <p:nvPr>
-            <p:ph type="ctrTitle"/>
-          </p:nvPr>
-        </p:nvSpPr>
-        <p:spPr/>
-        <p:txBody>
-          <a:bodyPr/>
-          <a:lstStyle/>
-          <a:p>
-            <a:endParaRPr lang="en-US"/>
-          </a:p>
-        </p:txBody>
-      </p:sp>
-      <p:sp>
-        <p:nvSpPr>
-          <p:cNvPr id="3" name="Subtitle 2">
-            <a:extLst>
-              <a:ext uri="{FF2B5EF4-FFF2-40B4-BE49-F238E27FC236}">
-                <a16:creationId xmlns:a16="http://schemas.microsoft.com/office/drawing/2014/main" id="{87063B8D-EDD9-BF4B-BA3E-D5292C3CD8D1}"/>
-              </a:ext>
-            </a:extLst>
-          </p:cNvPr>
-          <p:cNvSpPr>
-            <a:spLocks noGrp="1"/>
-          </p:cNvSpPr>
-          <p:nvPr>
-            <p:ph type="subTitle" idx="1"/>
-          </p:nvPr>
-        </p:nvSpPr>
-        <p:spPr/>
-        <p:txBody>
-          <a:bodyPr/>
-          <a:lstStyle/>
-          <a:p>
-            <a:endParaRPr lang="en-US"/>
-          </a:p>
-        </p:txBody>
-      </p:sp>
-    </p:spTree>
-    <p:extLst>
-      <p:ext uri="{BB962C8B-B14F-4D97-AF65-F5344CB8AC3E}">
-        <p14:creationId xmlns:p14="http://schemas.microsoft.com/office/powerpoint/2010/main" val="1121662126"/>
-      </p:ext>
-    </p:extLst>
-  </p:cSld>
-  <p:clrMapOvr>
-    <a:masterClrMapping/>
-  </p:clrMapOvr>
-</p:sld>
-</file>
-
-<file path=ppt/slides/slide2.xml><?xml version="1.0" encoding="utf-8"?>
-<p:sld xmlns:a="http://schemas.openxmlformats.org/drawingml/2006/main" xmlns:r="http://schemas.openxmlformats.org/officeDocument/2006/relationships" xmlns:p="http://schemas.openxmlformats.org/presentationml/2006/main">
-  <p:cSld>
-    <p:spTree>
-      <p:nvGrpSpPr>
-        <p:cNvPr id="1" name=""/>
-        <p:cNvGrpSpPr/>
-        <p:nvPr/>
-      </p:nvGrpSpPr>
-      <p:grpSpPr>
-        <a:xfrm>
-          <a:off x="0" y="0"/>
-          <a:ext cx="0" cy="0"/>
-          <a:chOff x="0" y="0"/>
-          <a:chExt cx="0" cy="0"/>
-        </a:xfrm>
-      </p:grpSpPr>
       <p:pic>
         <p:nvPicPr>
           <p:cNvPr id="1034" name="Picture 10">
@@ -3822,6 +3748,908 @@
     <p:extLst>
       <p:ext uri="{BB962C8B-B14F-4D97-AF65-F5344CB8AC3E}">
         <p14:creationId xmlns:p14="http://schemas.microsoft.com/office/powerpoint/2010/main" val="2341976560"/>
+      </p:ext>
+    </p:extLst>
+  </p:cSld>
+  <p:clrMapOvr>
+    <a:masterClrMapping/>
+  </p:clrMapOvr>
+</p:sld>
+</file>
+
+<file path=ppt/slides/slide2.xml><?xml version="1.0" encoding="utf-8"?>
+<p:sld xmlns:a="http://schemas.openxmlformats.org/drawingml/2006/main" xmlns:r="http://schemas.openxmlformats.org/officeDocument/2006/relationships" xmlns:p="http://schemas.openxmlformats.org/presentationml/2006/main">
+  <p:cSld>
+    <p:spTree>
+      <p:nvGrpSpPr>
+        <p:cNvPr id="1" name=""/>
+        <p:cNvGrpSpPr/>
+        <p:nvPr/>
+      </p:nvGrpSpPr>
+      <p:grpSpPr>
+        <a:xfrm>
+          <a:off x="0" y="0"/>
+          <a:ext cx="0" cy="0"/>
+          <a:chOff x="0" y="0"/>
+          <a:chExt cx="0" cy="0"/>
+        </a:xfrm>
+      </p:grpSpPr>
+      <p:pic>
+        <p:nvPicPr>
+          <p:cNvPr id="11" name="Picture 10">
+            <a:extLst>
+              <a:ext uri="{FF2B5EF4-FFF2-40B4-BE49-F238E27FC236}">
+                <a16:creationId xmlns:a16="http://schemas.microsoft.com/office/drawing/2014/main" id="{AB6CE3F6-380F-A940-B58D-6C2F50D1F147}"/>
+              </a:ext>
+            </a:extLst>
+          </p:cNvPr>
+          <p:cNvPicPr>
+            <a:picLocks noChangeAspect="1"/>
+          </p:cNvPicPr>
+          <p:nvPr/>
+        </p:nvPicPr>
+        <p:blipFill>
+          <a:blip r:embed="rId2"/>
+          <a:stretch>
+            <a:fillRect/>
+          </a:stretch>
+        </p:blipFill>
+        <p:spPr>
+          <a:xfrm>
+            <a:off x="2057400" y="1016000"/>
+            <a:ext cx="8166100" cy="4826000"/>
+          </a:xfrm>
+          <a:prstGeom prst="rect">
+            <a:avLst/>
+          </a:prstGeom>
+        </p:spPr>
+      </p:pic>
+      <p:pic>
+        <p:nvPicPr>
+          <p:cNvPr id="4" name="Picture 3">
+            <a:extLst>
+              <a:ext uri="{FF2B5EF4-FFF2-40B4-BE49-F238E27FC236}">
+                <a16:creationId xmlns:a16="http://schemas.microsoft.com/office/drawing/2014/main" id="{9483C8BD-CEDE-9549-AF8D-AA58481360AA}"/>
+              </a:ext>
+            </a:extLst>
+          </p:cNvPr>
+          <p:cNvPicPr>
+            <a:picLocks noChangeAspect="1"/>
+          </p:cNvPicPr>
+          <p:nvPr/>
+        </p:nvPicPr>
+        <p:blipFill>
+          <a:blip r:embed="rId3"/>
+          <a:stretch>
+            <a:fillRect/>
+          </a:stretch>
+        </p:blipFill>
+        <p:spPr>
+          <a:xfrm>
+            <a:off x="1866183" y="1293189"/>
+            <a:ext cx="101727" cy="101727"/>
+          </a:xfrm>
+          <a:prstGeom prst="rect">
+            <a:avLst/>
+          </a:prstGeom>
+        </p:spPr>
+      </p:pic>
+      <p:pic>
+        <p:nvPicPr>
+          <p:cNvPr id="7" name="Picture 6">
+            <a:extLst>
+              <a:ext uri="{FF2B5EF4-FFF2-40B4-BE49-F238E27FC236}">
+                <a16:creationId xmlns:a16="http://schemas.microsoft.com/office/drawing/2014/main" id="{92385317-D792-5543-B622-A81ABEC34B88}"/>
+              </a:ext>
+            </a:extLst>
+          </p:cNvPr>
+          <p:cNvPicPr>
+            <a:picLocks noChangeAspect="1"/>
+          </p:cNvPicPr>
+          <p:nvPr/>
+        </p:nvPicPr>
+        <p:blipFill>
+          <a:blip r:embed="rId4"/>
+          <a:stretch>
+            <a:fillRect/>
+          </a:stretch>
+        </p:blipFill>
+        <p:spPr>
+          <a:xfrm>
+            <a:off x="1569499" y="1837371"/>
+            <a:ext cx="542544" cy="214757"/>
+          </a:xfrm>
+          <a:prstGeom prst="rect">
+            <a:avLst/>
+          </a:prstGeom>
+        </p:spPr>
+      </p:pic>
+      <p:pic>
+        <p:nvPicPr>
+          <p:cNvPr id="8" name="Picture 7">
+            <a:extLst>
+              <a:ext uri="{FF2B5EF4-FFF2-40B4-BE49-F238E27FC236}">
+                <a16:creationId xmlns:a16="http://schemas.microsoft.com/office/drawing/2014/main" id="{8888FF69-E482-CF41-B8F4-8FCE0155C96B}"/>
+              </a:ext>
+            </a:extLst>
+          </p:cNvPr>
+          <p:cNvPicPr>
+            <a:picLocks noChangeAspect="1"/>
+          </p:cNvPicPr>
+          <p:nvPr/>
+        </p:nvPicPr>
+        <p:blipFill>
+          <a:blip r:embed="rId5"/>
+          <a:stretch>
+            <a:fillRect/>
+          </a:stretch>
+        </p:blipFill>
+        <p:spPr>
+          <a:xfrm>
+            <a:off x="1188499" y="2430433"/>
+            <a:ext cx="881634" cy="214757"/>
+          </a:xfrm>
+          <a:prstGeom prst="rect">
+            <a:avLst/>
+          </a:prstGeom>
+        </p:spPr>
+      </p:pic>
+      <p:pic>
+        <p:nvPicPr>
+          <p:cNvPr id="12" name="Picture 11">
+            <a:extLst>
+              <a:ext uri="{FF2B5EF4-FFF2-40B4-BE49-F238E27FC236}">
+                <a16:creationId xmlns:a16="http://schemas.microsoft.com/office/drawing/2014/main" id="{56189B38-AC0F-554D-9669-157DA463B5CC}"/>
+              </a:ext>
+            </a:extLst>
+          </p:cNvPr>
+          <p:cNvPicPr>
+            <a:picLocks noChangeAspect="1"/>
+          </p:cNvPicPr>
+          <p:nvPr/>
+        </p:nvPicPr>
+        <p:blipFill>
+          <a:blip r:embed="rId6"/>
+          <a:stretch>
+            <a:fillRect/>
+          </a:stretch>
+        </p:blipFill>
+        <p:spPr>
+          <a:xfrm>
+            <a:off x="1359949" y="5329647"/>
+            <a:ext cx="745998" cy="248666"/>
+          </a:xfrm>
+          <a:prstGeom prst="rect">
+            <a:avLst/>
+          </a:prstGeom>
+        </p:spPr>
+      </p:pic>
+      <p:pic>
+        <p:nvPicPr>
+          <p:cNvPr id="13" name="Picture 12">
+            <a:extLst>
+              <a:ext uri="{FF2B5EF4-FFF2-40B4-BE49-F238E27FC236}">
+                <a16:creationId xmlns:a16="http://schemas.microsoft.com/office/drawing/2014/main" id="{6DBC6225-435A-1A46-BC84-12EA455FED57}"/>
+              </a:ext>
+            </a:extLst>
+          </p:cNvPr>
+          <p:cNvPicPr>
+            <a:picLocks noChangeAspect="1"/>
+          </p:cNvPicPr>
+          <p:nvPr/>
+        </p:nvPicPr>
+        <p:blipFill>
+          <a:blip r:embed="rId7"/>
+          <a:stretch>
+            <a:fillRect/>
+          </a:stretch>
+        </p:blipFill>
+        <p:spPr>
+          <a:xfrm>
+            <a:off x="1366299" y="2979265"/>
+            <a:ext cx="723392" cy="214757"/>
+          </a:xfrm>
+          <a:prstGeom prst="rect">
+            <a:avLst/>
+          </a:prstGeom>
+        </p:spPr>
+      </p:pic>
+      <p:pic>
+        <p:nvPicPr>
+          <p:cNvPr id="14" name="Picture 13">
+            <a:extLst>
+              <a:ext uri="{FF2B5EF4-FFF2-40B4-BE49-F238E27FC236}">
+                <a16:creationId xmlns:a16="http://schemas.microsoft.com/office/drawing/2014/main" id="{F4E60496-3BAD-ED42-AB15-8B73BAD028AB}"/>
+              </a:ext>
+            </a:extLst>
+          </p:cNvPr>
+          <p:cNvPicPr>
+            <a:picLocks noChangeAspect="1"/>
+          </p:cNvPicPr>
+          <p:nvPr/>
+        </p:nvPicPr>
+        <p:blipFill>
+          <a:blip r:embed="rId8"/>
+          <a:stretch>
+            <a:fillRect/>
+          </a:stretch>
+        </p:blipFill>
+        <p:spPr>
+          <a:xfrm>
+            <a:off x="1188505" y="4736585"/>
+            <a:ext cx="938149" cy="248666"/>
+          </a:xfrm>
+          <a:prstGeom prst="rect">
+            <a:avLst/>
+          </a:prstGeom>
+        </p:spPr>
+      </p:pic>
+      <p:pic>
+        <p:nvPicPr>
+          <p:cNvPr id="15" name="Picture 14">
+            <a:extLst>
+              <a:ext uri="{FF2B5EF4-FFF2-40B4-BE49-F238E27FC236}">
+                <a16:creationId xmlns:a16="http://schemas.microsoft.com/office/drawing/2014/main" id="{91C1B230-BE2E-6C4F-8922-982B602B3739}"/>
+              </a:ext>
+            </a:extLst>
+          </p:cNvPr>
+          <p:cNvPicPr>
+            <a:picLocks noChangeAspect="1"/>
+          </p:cNvPicPr>
+          <p:nvPr/>
+        </p:nvPicPr>
+        <p:blipFill>
+          <a:blip r:embed="rId9"/>
+          <a:stretch>
+            <a:fillRect/>
+          </a:stretch>
+        </p:blipFill>
+        <p:spPr>
+          <a:xfrm>
+            <a:off x="1531405" y="4166733"/>
+            <a:ext cx="576453" cy="248666"/>
+          </a:xfrm>
+          <a:prstGeom prst="rect">
+            <a:avLst/>
+          </a:prstGeom>
+        </p:spPr>
+      </p:pic>
+      <p:pic>
+        <p:nvPicPr>
+          <p:cNvPr id="16" name="Picture 15">
+            <a:extLst>
+              <a:ext uri="{FF2B5EF4-FFF2-40B4-BE49-F238E27FC236}">
+                <a16:creationId xmlns:a16="http://schemas.microsoft.com/office/drawing/2014/main" id="{8AC46081-836A-C94A-B1C0-448860DE7AD0}"/>
+              </a:ext>
+            </a:extLst>
+          </p:cNvPr>
+          <p:cNvPicPr>
+            <a:picLocks noChangeAspect="1"/>
+          </p:cNvPicPr>
+          <p:nvPr/>
+        </p:nvPicPr>
+        <p:blipFill>
+          <a:blip r:embed="rId10"/>
+          <a:stretch>
+            <a:fillRect/>
+          </a:stretch>
+        </p:blipFill>
+        <p:spPr>
+          <a:xfrm>
+            <a:off x="1863795" y="3605207"/>
+            <a:ext cx="124333" cy="146939"/>
+          </a:xfrm>
+          <a:prstGeom prst="rect">
+            <a:avLst/>
+          </a:prstGeom>
+        </p:spPr>
+      </p:pic>
+      <p:pic>
+        <p:nvPicPr>
+          <p:cNvPr id="17" name="Picture 16">
+            <a:extLst>
+              <a:ext uri="{FF2B5EF4-FFF2-40B4-BE49-F238E27FC236}">
+                <a16:creationId xmlns:a16="http://schemas.microsoft.com/office/drawing/2014/main" id="{16536EE2-9193-8D48-A3BE-798F8D4DAEE5}"/>
+              </a:ext>
+            </a:extLst>
+          </p:cNvPr>
+          <p:cNvPicPr>
+            <a:picLocks noChangeAspect="1"/>
+          </p:cNvPicPr>
+          <p:nvPr/>
+        </p:nvPicPr>
+        <p:blipFill>
+          <a:blip r:embed="rId11"/>
+          <a:stretch>
+            <a:fillRect/>
+          </a:stretch>
+        </p:blipFill>
+        <p:spPr>
+          <a:xfrm>
+            <a:off x="2319721" y="908054"/>
+            <a:ext cx="607568" cy="198628"/>
+          </a:xfrm>
+          <a:prstGeom prst="rect">
+            <a:avLst/>
+          </a:prstGeom>
+        </p:spPr>
+      </p:pic>
+      <p:pic>
+        <p:nvPicPr>
+          <p:cNvPr id="19" name="Picture 18">
+            <a:extLst>
+              <a:ext uri="{FF2B5EF4-FFF2-40B4-BE49-F238E27FC236}">
+                <a16:creationId xmlns:a16="http://schemas.microsoft.com/office/drawing/2014/main" id="{320F9B9F-D423-7B40-AE29-37E952294542}"/>
+              </a:ext>
+            </a:extLst>
+          </p:cNvPr>
+          <p:cNvPicPr>
+            <a:picLocks noChangeAspect="1"/>
+          </p:cNvPicPr>
+          <p:nvPr/>
+        </p:nvPicPr>
+        <p:blipFill>
+          <a:blip r:embed="rId12"/>
+          <a:stretch>
+            <a:fillRect/>
+          </a:stretch>
+        </p:blipFill>
+        <p:spPr>
+          <a:xfrm>
+            <a:off x="3642713" y="908054"/>
+            <a:ext cx="607568" cy="198628"/>
+          </a:xfrm>
+          <a:prstGeom prst="rect">
+            <a:avLst/>
+          </a:prstGeom>
+        </p:spPr>
+      </p:pic>
+      <p:pic>
+        <p:nvPicPr>
+          <p:cNvPr id="20" name="Picture 19">
+            <a:extLst>
+              <a:ext uri="{FF2B5EF4-FFF2-40B4-BE49-F238E27FC236}">
+                <a16:creationId xmlns:a16="http://schemas.microsoft.com/office/drawing/2014/main" id="{7F817C24-A225-7648-8837-25367E7781D2}"/>
+              </a:ext>
+            </a:extLst>
+          </p:cNvPr>
+          <p:cNvPicPr>
+            <a:picLocks noChangeAspect="1"/>
+          </p:cNvPicPr>
+          <p:nvPr/>
+        </p:nvPicPr>
+        <p:blipFill>
+          <a:blip r:embed="rId13"/>
+          <a:stretch>
+            <a:fillRect/>
+          </a:stretch>
+        </p:blipFill>
+        <p:spPr>
+          <a:xfrm>
+            <a:off x="4923439" y="908054"/>
+            <a:ext cx="607568" cy="198628"/>
+          </a:xfrm>
+          <a:prstGeom prst="rect">
+            <a:avLst/>
+          </a:prstGeom>
+        </p:spPr>
+      </p:pic>
+      <p:pic>
+        <p:nvPicPr>
+          <p:cNvPr id="21" name="Picture 20">
+            <a:extLst>
+              <a:ext uri="{FF2B5EF4-FFF2-40B4-BE49-F238E27FC236}">
+                <a16:creationId xmlns:a16="http://schemas.microsoft.com/office/drawing/2014/main" id="{5EA9BC7B-364E-8C4F-ABF5-C45313EE4DBA}"/>
+              </a:ext>
+            </a:extLst>
+          </p:cNvPr>
+          <p:cNvPicPr>
+            <a:picLocks noChangeAspect="1"/>
+          </p:cNvPicPr>
+          <p:nvPr/>
+        </p:nvPicPr>
+        <p:blipFill>
+          <a:blip r:embed="rId14"/>
+          <a:stretch>
+            <a:fillRect/>
+          </a:stretch>
+        </p:blipFill>
+        <p:spPr>
+          <a:xfrm>
+            <a:off x="6286719" y="908054"/>
+            <a:ext cx="607568" cy="198628"/>
+          </a:xfrm>
+          <a:prstGeom prst="rect">
+            <a:avLst/>
+          </a:prstGeom>
+        </p:spPr>
+      </p:pic>
+      <p:pic>
+        <p:nvPicPr>
+          <p:cNvPr id="22" name="Picture 21">
+            <a:extLst>
+              <a:ext uri="{FF2B5EF4-FFF2-40B4-BE49-F238E27FC236}">
+                <a16:creationId xmlns:a16="http://schemas.microsoft.com/office/drawing/2014/main" id="{B4C73AB6-8DA9-4144-A3F9-FA11447E79E2}"/>
+              </a:ext>
+            </a:extLst>
+          </p:cNvPr>
+          <p:cNvPicPr>
+            <a:picLocks noChangeAspect="1"/>
+          </p:cNvPicPr>
+          <p:nvPr/>
+        </p:nvPicPr>
+        <p:blipFill>
+          <a:blip r:embed="rId15"/>
+          <a:stretch>
+            <a:fillRect/>
+          </a:stretch>
+        </p:blipFill>
+        <p:spPr>
+          <a:xfrm>
+            <a:off x="7660509" y="908054"/>
+            <a:ext cx="607568" cy="198628"/>
+          </a:xfrm>
+          <a:prstGeom prst="rect">
+            <a:avLst/>
+          </a:prstGeom>
+        </p:spPr>
+      </p:pic>
+      <p:pic>
+        <p:nvPicPr>
+          <p:cNvPr id="23" name="Picture 22">
+            <a:extLst>
+              <a:ext uri="{FF2B5EF4-FFF2-40B4-BE49-F238E27FC236}">
+                <a16:creationId xmlns:a16="http://schemas.microsoft.com/office/drawing/2014/main" id="{84797FCA-DBB0-BF40-BA64-BF31F54932D6}"/>
+              </a:ext>
+            </a:extLst>
+          </p:cNvPr>
+          <p:cNvPicPr>
+            <a:picLocks noChangeAspect="1"/>
+          </p:cNvPicPr>
+          <p:nvPr/>
+        </p:nvPicPr>
+        <p:blipFill>
+          <a:blip r:embed="rId16"/>
+          <a:stretch>
+            <a:fillRect/>
+          </a:stretch>
+        </p:blipFill>
+        <p:spPr>
+          <a:xfrm>
+            <a:off x="8918136" y="908054"/>
+            <a:ext cx="607568" cy="198628"/>
+          </a:xfrm>
+          <a:prstGeom prst="rect">
+            <a:avLst/>
+          </a:prstGeom>
+        </p:spPr>
+      </p:pic>
+    </p:spTree>
+    <p:extLst>
+      <p:ext uri="{BB962C8B-B14F-4D97-AF65-F5344CB8AC3E}">
+        <p14:creationId xmlns:p14="http://schemas.microsoft.com/office/powerpoint/2010/main" val="4262975663"/>
+      </p:ext>
+    </p:extLst>
+  </p:cSld>
+  <p:clrMapOvr>
+    <a:masterClrMapping/>
+  </p:clrMapOvr>
+</p:sld>
+</file>
+
+<file path=ppt/slides/slide3.xml><?xml version="1.0" encoding="utf-8"?>
+<p:sld xmlns:a="http://schemas.openxmlformats.org/drawingml/2006/main" xmlns:r="http://schemas.openxmlformats.org/officeDocument/2006/relationships" xmlns:p="http://schemas.openxmlformats.org/presentationml/2006/main">
+  <p:cSld>
+    <p:spTree>
+      <p:nvGrpSpPr>
+        <p:cNvPr id="1" name=""/>
+        <p:cNvGrpSpPr/>
+        <p:nvPr/>
+      </p:nvGrpSpPr>
+      <p:grpSpPr>
+        <a:xfrm>
+          <a:off x="0" y="0"/>
+          <a:ext cx="0" cy="0"/>
+          <a:chOff x="0" y="0"/>
+          <a:chExt cx="0" cy="0"/>
+        </a:xfrm>
+      </p:grpSpPr>
+      <p:pic>
+        <p:nvPicPr>
+          <p:cNvPr id="12" name="Picture 11">
+            <a:extLst>
+              <a:ext uri="{FF2B5EF4-FFF2-40B4-BE49-F238E27FC236}">
+                <a16:creationId xmlns:a16="http://schemas.microsoft.com/office/drawing/2014/main" id="{DBBB3EDE-0120-DF41-BCAB-B0CBB3297C78}"/>
+              </a:ext>
+            </a:extLst>
+          </p:cNvPr>
+          <p:cNvPicPr>
+            <a:picLocks noChangeAspect="1"/>
+          </p:cNvPicPr>
+          <p:nvPr/>
+        </p:nvPicPr>
+        <p:blipFill>
+          <a:blip r:embed="rId2"/>
+          <a:stretch>
+            <a:fillRect/>
+          </a:stretch>
+        </p:blipFill>
+        <p:spPr>
+          <a:xfrm>
+            <a:off x="926054" y="1130240"/>
+            <a:ext cx="3243327" cy="2559360"/>
+          </a:xfrm>
+          <a:prstGeom prst="rect">
+            <a:avLst/>
+          </a:prstGeom>
+        </p:spPr>
+      </p:pic>
+      <p:pic>
+        <p:nvPicPr>
+          <p:cNvPr id="13" name="Picture 12">
+            <a:extLst>
+              <a:ext uri="{FF2B5EF4-FFF2-40B4-BE49-F238E27FC236}">
+                <a16:creationId xmlns:a16="http://schemas.microsoft.com/office/drawing/2014/main" id="{87F10663-C478-A948-8BFD-3F55E30133B2}"/>
+              </a:ext>
+            </a:extLst>
+          </p:cNvPr>
+          <p:cNvPicPr>
+            <a:picLocks noChangeAspect="1"/>
+          </p:cNvPicPr>
+          <p:nvPr/>
+        </p:nvPicPr>
+        <p:blipFill>
+          <a:blip r:embed="rId3"/>
+          <a:stretch>
+            <a:fillRect/>
+          </a:stretch>
+        </p:blipFill>
+        <p:spPr>
+          <a:xfrm>
+            <a:off x="2203262" y="1510192"/>
+            <a:ext cx="457200" cy="165100"/>
+          </a:xfrm>
+          <a:prstGeom prst="rect">
+            <a:avLst/>
+          </a:prstGeom>
+        </p:spPr>
+      </p:pic>
+      <p:pic>
+        <p:nvPicPr>
+          <p:cNvPr id="20" name="Picture 19">
+            <a:extLst>
+              <a:ext uri="{FF2B5EF4-FFF2-40B4-BE49-F238E27FC236}">
+                <a16:creationId xmlns:a16="http://schemas.microsoft.com/office/drawing/2014/main" id="{5F4F1EFC-34C7-F34C-9A40-E7DBD9A404E9}"/>
+              </a:ext>
+            </a:extLst>
+          </p:cNvPr>
+          <p:cNvPicPr>
+            <a:picLocks noChangeAspect="1"/>
+          </p:cNvPicPr>
+          <p:nvPr/>
+        </p:nvPicPr>
+        <p:blipFill>
+          <a:blip r:embed="rId4"/>
+          <a:stretch>
+            <a:fillRect/>
+          </a:stretch>
+        </p:blipFill>
+        <p:spPr>
+          <a:xfrm>
+            <a:off x="6096000" y="1163472"/>
+            <a:ext cx="3243327" cy="2559360"/>
+          </a:xfrm>
+          <a:prstGeom prst="rect">
+            <a:avLst/>
+          </a:prstGeom>
+        </p:spPr>
+      </p:pic>
+      <p:pic>
+        <p:nvPicPr>
+          <p:cNvPr id="21" name="Picture 20">
+            <a:extLst>
+              <a:ext uri="{FF2B5EF4-FFF2-40B4-BE49-F238E27FC236}">
+                <a16:creationId xmlns:a16="http://schemas.microsoft.com/office/drawing/2014/main" id="{2A82E6AE-6DC6-BD4C-87F7-5FDBEADA576E}"/>
+              </a:ext>
+            </a:extLst>
+          </p:cNvPr>
+          <p:cNvPicPr>
+            <a:picLocks noChangeAspect="1"/>
+          </p:cNvPicPr>
+          <p:nvPr/>
+        </p:nvPicPr>
+        <p:blipFill>
+          <a:blip r:embed="rId3"/>
+          <a:stretch>
+            <a:fillRect/>
+          </a:stretch>
+        </p:blipFill>
+        <p:spPr>
+          <a:xfrm>
+            <a:off x="7442237" y="1510192"/>
+            <a:ext cx="457200" cy="165100"/>
+          </a:xfrm>
+          <a:prstGeom prst="rect">
+            <a:avLst/>
+          </a:prstGeom>
+        </p:spPr>
+      </p:pic>
+      <p:sp>
+        <p:nvSpPr>
+          <p:cNvPr id="14" name="Rounded Rectangle 13">
+            <a:extLst>
+              <a:ext uri="{FF2B5EF4-FFF2-40B4-BE49-F238E27FC236}">
+                <a16:creationId xmlns:a16="http://schemas.microsoft.com/office/drawing/2014/main" id="{2178AA6F-0585-1945-A5C1-CF36E14407EA}"/>
+              </a:ext>
+            </a:extLst>
+          </p:cNvPr>
+          <p:cNvSpPr/>
+          <p:nvPr/>
+        </p:nvSpPr>
+        <p:spPr>
+          <a:xfrm>
+            <a:off x="4963912" y="1163472"/>
+            <a:ext cx="93738" cy="2559361"/>
+          </a:xfrm>
+          <a:prstGeom prst="roundRect">
+            <a:avLst/>
+          </a:prstGeom>
+          <a:noFill/>
+          <a:ln>
+            <a:solidFill>
+              <a:schemeClr val="accent1"/>
+            </a:solidFill>
+          </a:ln>
+        </p:spPr>
+        <p:style>
+          <a:lnRef idx="2">
+            <a:schemeClr val="accent1">
+              <a:shade val="50000"/>
+            </a:schemeClr>
+          </a:lnRef>
+          <a:fillRef idx="1">
+            <a:schemeClr val="accent1"/>
+          </a:fillRef>
+          <a:effectRef idx="0">
+            <a:schemeClr val="accent1"/>
+          </a:effectRef>
+          <a:fontRef idx="minor">
+            <a:schemeClr val="lt1"/>
+          </a:fontRef>
+        </p:style>
+        <p:txBody>
+          <a:bodyPr rtlCol="0" anchor="ctr"/>
+          <a:lstStyle/>
+          <a:p>
+            <a:pPr algn="ctr"/>
+            <a:r>
+              <a:rPr lang="en-US" dirty="0">
+                <a:ln w="0"/>
+                <a:solidFill>
+                  <a:schemeClr val="accent1"/>
+                </a:solidFill>
+                <a:effectLst>
+                  <a:outerShdw blurRad="38100" dist="25400" dir="5400000" algn="ctr" rotWithShape="0">
+                    <a:srgbClr val="6E747A">
+                      <a:alpha val="43000"/>
+                    </a:srgbClr>
+                  </a:outerShdw>
+                </a:effectLst>
+              </a:rPr>
+              <a:t>  </a:t>
+            </a:r>
+          </a:p>
+        </p:txBody>
+      </p:sp>
+      <p:sp>
+        <p:nvSpPr>
+          <p:cNvPr id="15" name="TextBox 14">
+            <a:extLst>
+              <a:ext uri="{FF2B5EF4-FFF2-40B4-BE49-F238E27FC236}">
+                <a16:creationId xmlns:a16="http://schemas.microsoft.com/office/drawing/2014/main" id="{ECD1C170-BA1A-3845-B79F-1499667BC2B1}"/>
+              </a:ext>
+            </a:extLst>
+          </p:cNvPr>
+          <p:cNvSpPr txBox="1"/>
+          <p:nvPr/>
+        </p:nvSpPr>
+        <p:spPr>
+          <a:xfrm>
+            <a:off x="5118493" y="3794502"/>
+            <a:ext cx="782587" cy="430887"/>
+          </a:xfrm>
+          <a:prstGeom prst="rect">
+            <a:avLst/>
+          </a:prstGeom>
+          <a:noFill/>
+        </p:spPr>
+        <p:txBody>
+          <a:bodyPr wrap="none" rtlCol="0">
+            <a:spAutoFit/>
+          </a:bodyPr>
+          <a:lstStyle/>
+          <a:p>
+            <a:pPr algn="ctr"/>
+            <a:r>
+              <a:rPr lang="en-US" sz="1100" dirty="0"/>
+              <a:t>Latent var</a:t>
+            </a:r>
+          </a:p>
+          <a:p>
+            <a:pPr algn="ctr"/>
+            <a:r>
+              <a:rPr lang="en-US" sz="1100" dirty="0"/>
+              <a:t> </a:t>
+            </a:r>
+            <a:r>
+              <a:rPr lang="en-US" sz="1100" b="1" dirty="0"/>
+              <a:t>z</a:t>
+            </a:r>
+            <a:r>
+              <a:rPr lang="en-US" sz="1100" dirty="0"/>
+              <a:t>: 924*1</a:t>
+            </a:r>
+          </a:p>
+        </p:txBody>
+      </p:sp>
+      <p:cxnSp>
+        <p:nvCxnSpPr>
+          <p:cNvPr id="16" name="Straight Arrow Connector 15">
+            <a:extLst>
+              <a:ext uri="{FF2B5EF4-FFF2-40B4-BE49-F238E27FC236}">
+                <a16:creationId xmlns:a16="http://schemas.microsoft.com/office/drawing/2014/main" id="{66595A1B-3E5C-1E4F-91B3-15A8D9F7A2C2}"/>
+              </a:ext>
+            </a:extLst>
+          </p:cNvPr>
+          <p:cNvCxnSpPr>
+            <a:cxnSpLocks/>
+            <a:endCxn id="14" idx="1"/>
+          </p:cNvCxnSpPr>
+          <p:nvPr/>
+        </p:nvCxnSpPr>
+        <p:spPr>
+          <a:xfrm>
+            <a:off x="4025590" y="2443153"/>
+            <a:ext cx="938322" cy="0"/>
+          </a:xfrm>
+          <a:prstGeom prst="straightConnector1">
+            <a:avLst/>
+          </a:prstGeom>
+          <a:ln>
+            <a:tailEnd type="triangle"/>
+          </a:ln>
+        </p:spPr>
+        <p:style>
+          <a:lnRef idx="1">
+            <a:schemeClr val="accent1"/>
+          </a:lnRef>
+          <a:fillRef idx="0">
+            <a:schemeClr val="accent1"/>
+          </a:fillRef>
+          <a:effectRef idx="0">
+            <a:schemeClr val="accent1"/>
+          </a:effectRef>
+          <a:fontRef idx="minor">
+            <a:schemeClr val="tx1"/>
+          </a:fontRef>
+        </p:style>
+      </p:cxnSp>
+      <p:sp>
+        <p:nvSpPr>
+          <p:cNvPr id="17" name="TextBox 16">
+            <a:extLst>
+              <a:ext uri="{FF2B5EF4-FFF2-40B4-BE49-F238E27FC236}">
+                <a16:creationId xmlns:a16="http://schemas.microsoft.com/office/drawing/2014/main" id="{02F51550-BE73-8D44-A314-10BA82EE7FCA}"/>
+              </a:ext>
+            </a:extLst>
+          </p:cNvPr>
+          <p:cNvSpPr txBox="1"/>
+          <p:nvPr/>
+        </p:nvSpPr>
+        <p:spPr>
+          <a:xfrm>
+            <a:off x="4173459" y="2409920"/>
+            <a:ext cx="671979" cy="261610"/>
+          </a:xfrm>
+          <a:prstGeom prst="rect">
+            <a:avLst/>
+          </a:prstGeom>
+          <a:noFill/>
+        </p:spPr>
+        <p:txBody>
+          <a:bodyPr wrap="none" rtlCol="0">
+            <a:spAutoFit/>
+          </a:bodyPr>
+          <a:lstStyle/>
+          <a:p>
+            <a:r>
+              <a:rPr lang="en-US" sz="1100" dirty="0"/>
+              <a:t>encoder</a:t>
+            </a:r>
+          </a:p>
+        </p:txBody>
+      </p:sp>
+      <p:cxnSp>
+        <p:nvCxnSpPr>
+          <p:cNvPr id="18" name="Straight Arrow Connector 17">
+            <a:extLst>
+              <a:ext uri="{FF2B5EF4-FFF2-40B4-BE49-F238E27FC236}">
+                <a16:creationId xmlns:a16="http://schemas.microsoft.com/office/drawing/2014/main" id="{4D4DA8EB-05A9-E744-B353-687950785D06}"/>
+              </a:ext>
+            </a:extLst>
+          </p:cNvPr>
+          <p:cNvCxnSpPr>
+            <a:cxnSpLocks/>
+            <a:stCxn id="14" idx="3"/>
+          </p:cNvCxnSpPr>
+          <p:nvPr/>
+        </p:nvCxnSpPr>
+        <p:spPr>
+          <a:xfrm>
+            <a:off x="5057650" y="2443153"/>
+            <a:ext cx="1122379" cy="0"/>
+          </a:xfrm>
+          <a:prstGeom prst="straightConnector1">
+            <a:avLst/>
+          </a:prstGeom>
+          <a:ln>
+            <a:tailEnd type="triangle"/>
+          </a:ln>
+        </p:spPr>
+        <p:style>
+          <a:lnRef idx="1">
+            <a:schemeClr val="accent1"/>
+          </a:lnRef>
+          <a:fillRef idx="0">
+            <a:schemeClr val="accent1"/>
+          </a:fillRef>
+          <a:effectRef idx="0">
+            <a:schemeClr val="accent1"/>
+          </a:effectRef>
+          <a:fontRef idx="minor">
+            <a:schemeClr val="tx1"/>
+          </a:fontRef>
+        </p:style>
+      </p:cxnSp>
+      <p:sp>
+        <p:nvSpPr>
+          <p:cNvPr id="19" name="TextBox 18">
+            <a:extLst>
+              <a:ext uri="{FF2B5EF4-FFF2-40B4-BE49-F238E27FC236}">
+                <a16:creationId xmlns:a16="http://schemas.microsoft.com/office/drawing/2014/main" id="{6C08A7A5-77C8-8249-B71E-A92405B5EA4A}"/>
+              </a:ext>
+            </a:extLst>
+          </p:cNvPr>
+          <p:cNvSpPr txBox="1"/>
+          <p:nvPr/>
+        </p:nvSpPr>
+        <p:spPr>
+          <a:xfrm>
+            <a:off x="5365363" y="2409920"/>
+            <a:ext cx="814666" cy="261610"/>
+          </a:xfrm>
+          <a:prstGeom prst="rect">
+            <a:avLst/>
+          </a:prstGeom>
+          <a:noFill/>
+        </p:spPr>
+        <p:txBody>
+          <a:bodyPr wrap="square" rtlCol="0">
+            <a:spAutoFit/>
+          </a:bodyPr>
+          <a:lstStyle/>
+          <a:p>
+            <a:r>
+              <a:rPr lang="en-US" sz="1100" dirty="0"/>
+              <a:t>decoder</a:t>
+            </a:r>
+          </a:p>
+        </p:txBody>
+      </p:sp>
+    </p:spTree>
+    <p:extLst>
+      <p:ext uri="{BB962C8B-B14F-4D97-AF65-F5344CB8AC3E}">
+        <p14:creationId xmlns:p14="http://schemas.microsoft.com/office/powerpoint/2010/main" val="580231992"/>
       </p:ext>
     </p:extLst>
   </p:cSld>

</xml_diff>